<commit_message>
Pushing initial formatted ppt
</commit_message>
<xml_diff>
--- a/presentation.pptx
+++ b/presentation.pptx
@@ -12,15 +12,14 @@
     <p:sldId id="260" r:id="rId6"/>
     <p:sldId id="261" r:id="rId7"/>
     <p:sldId id="262" r:id="rId8"/>
-    <p:sldId id="278" r:id="rId9"/>
-    <p:sldId id="263" r:id="rId10"/>
-    <p:sldId id="273" r:id="rId11"/>
-    <p:sldId id="274" r:id="rId12"/>
-    <p:sldId id="275" r:id="rId13"/>
-    <p:sldId id="277" r:id="rId14"/>
-    <p:sldId id="279" r:id="rId15"/>
-    <p:sldId id="280" r:id="rId16"/>
-    <p:sldId id="281" r:id="rId17"/>
+    <p:sldId id="263" r:id="rId9"/>
+    <p:sldId id="273" r:id="rId10"/>
+    <p:sldId id="274" r:id="rId11"/>
+    <p:sldId id="275" r:id="rId12"/>
+    <p:sldId id="277" r:id="rId13"/>
+    <p:sldId id="279" r:id="rId14"/>
+    <p:sldId id="280" r:id="rId15"/>
+    <p:sldId id="281" r:id="rId16"/>
   </p:sldIdLst>
   <p:sldSz cx="12192000" cy="6858000"/>
   <p:notesSz cx="6858000" cy="9144000"/>
@@ -3850,7 +3849,7 @@
           <p:cNvPr id="17" name="Rectangle 16">
             <a:extLst>
               <a:ext uri="{FF2B5EF4-FFF2-40B4-BE49-F238E27FC236}">
-                <a16:creationId xmlns:a16="http://schemas.microsoft.com/office/drawing/2014/main" id="{058A14AF-9FB5-4CC7-BA35-E8E85D3EDF0E}"/>
+                <a16:creationId xmlns:a16="http://schemas.microsoft.com/office/drawing/2014/main" id="{26CAED0A-2A45-4C9C-BCDD-21A8A092C5F3}"/>
               </a:ext>
               <a:ext uri="{C183D7F6-B498-43B3-948B-1728B52AA6E4}">
                 <adec:decorative xmlns:adec="http://schemas.microsoft.com/office/drawing/2017/decorative" val="1"/>
@@ -3910,7 +3909,7 @@
           <p:cNvPr id="2" name="Title 1">
             <a:extLst>
               <a:ext uri="{FF2B5EF4-FFF2-40B4-BE49-F238E27FC236}">
-                <a16:creationId xmlns:a16="http://schemas.microsoft.com/office/drawing/2014/main" id="{823E44DC-3740-2D30-28C6-24C3DA4C87D6}"/>
+                <a16:creationId xmlns:a16="http://schemas.microsoft.com/office/drawing/2014/main" id="{E77E6457-C4FF-4ADE-3F64-46F4A82DB9E2}"/>
               </a:ext>
             </a:extLst>
           </p:cNvPr>
@@ -3942,7 +3941,7 @@
                 <a:ea typeface="+mj-ea"/>
                 <a:cs typeface="+mj-cs"/>
               </a:rPr>
-              <a:t>Overall Portfolio Performance</a:t>
+              <a:t>Risk Profile &amp; Return Distribution</a:t>
             </a:r>
           </a:p>
         </p:txBody>
@@ -4085,7 +4084,7 @@
           <p:cNvPr id="12" name="TextBox 11">
             <a:extLst>
               <a:ext uri="{FF2B5EF4-FFF2-40B4-BE49-F238E27FC236}">
-                <a16:creationId xmlns:a16="http://schemas.microsoft.com/office/drawing/2014/main" id="{0E232222-CC7F-C3F9-1C47-10C613A35555}"/>
+                <a16:creationId xmlns:a16="http://schemas.microsoft.com/office/drawing/2014/main" id="{2ADAFF66-64D9-C27E-A480-7FB701E80F16}"/>
               </a:ext>
             </a:extLst>
           </p:cNvPr>
@@ -4094,8 +4093,8 @@
         </p:nvSpPr>
         <p:spPr>
           <a:xfrm>
-            <a:off x="793661" y="2599509"/>
-            <a:ext cx="4530898" cy="3639450"/>
+            <a:off x="793660" y="2599509"/>
+            <a:ext cx="4160725" cy="3598989"/>
           </a:xfrm>
           <a:prstGeom prst="rect">
             <a:avLst/>
@@ -4119,7 +4118,7 @@
             </a:pPr>
             <a:r>
               <a:rPr lang="en-US" sz="2000"/>
-              <a:t>ARL achieved positive total returns (~1.5%). </a:t>
+              <a:t>Maximum drawdown remained low due to inventory-aware safeguards. </a:t>
             </a:r>
           </a:p>
           <a:p>
@@ -4135,42 +4134,24 @@
             </a:pPr>
             <a:r>
               <a:rPr lang="en-US" sz="2000"/>
-              <a:t>Performance stayed consistent across calm and volatile regimes. </a:t>
-            </a:r>
-          </a:p>
-          <a:p>
-            <a:pPr marL="285750" indent="-228600">
-              <a:lnSpc>
-                <a:spcPct val="90000"/>
-              </a:lnSpc>
-              <a:spcAft>
-                <a:spcPts val="600"/>
-              </a:spcAft>
-              <a:buFont typeface="Arial" panose="020B0604020202020204" pitchFamily="34" charset="0"/>
-              <a:buChar char="•"/>
-            </a:pPr>
-            <a:r>
-              <a:rPr lang="en-US" sz="2000"/>
-              <a:t>ARL remained stable even as the EGT population evolved.</a:t>
+              <a:t>Return distribution is positively skewed; tail risks are suppressed.</a:t>
             </a:r>
           </a:p>
         </p:txBody>
       </p:sp>
       <p:pic>
         <p:nvPicPr>
-          <p:cNvPr id="9" name="Content Placeholder 8" descr="A graph showing a line graph&#10;&#10;AI-generated content may be incorrect.">
-            <a:extLst>
-              <a:ext uri="{FF2B5EF4-FFF2-40B4-BE49-F238E27FC236}">
-                <a16:creationId xmlns:a16="http://schemas.microsoft.com/office/drawing/2014/main" id="{1D0280F6-38F9-1083-200E-F6AA88A8AAD0}"/>
+          <p:cNvPr id="11" name="Picture 10" descr="A diagram of a distribution of step returns&#10;&#10;AI-generated content may be incorrect.">
+            <a:extLst>
+              <a:ext uri="{FF2B5EF4-FFF2-40B4-BE49-F238E27FC236}">
+                <a16:creationId xmlns:a16="http://schemas.microsoft.com/office/drawing/2014/main" id="{04C8F6B4-E99E-230D-EFA9-63C8E4E9D9E9}"/>
               </a:ext>
             </a:extLst>
           </p:cNvPr>
           <p:cNvPicPr>
-            <a:picLocks noGrp="1" noChangeAspect="1"/>
+            <a:picLocks noChangeAspect="1"/>
           </p:cNvPicPr>
-          <p:nvPr>
-            <p:ph idx="1"/>
-          </p:nvPr>
+          <p:nvPr/>
         </p:nvPicPr>
         <p:blipFill>
           <a:blip r:embed="rId2">
@@ -4180,14 +4161,54 @@
               </a:ext>
             </a:extLst>
           </a:blip>
+          <a:srcRect l="18722" r="24778" b="4"/>
           <a:stretch>
             <a:fillRect/>
           </a:stretch>
         </p:blipFill>
         <p:spPr>
           <a:xfrm>
-            <a:off x="6010509" y="2484255"/>
-            <a:ext cx="4952322" cy="3714244"/>
+            <a:off x="5418759" y="2559047"/>
+            <a:ext cx="2741805" cy="3639451"/>
+          </a:xfrm>
+          <a:prstGeom prst="rect">
+            <a:avLst/>
+          </a:prstGeom>
+        </p:spPr>
+      </p:pic>
+      <p:pic>
+        <p:nvPicPr>
+          <p:cNvPr id="9" name="Content Placeholder 8" descr="A graph showing a graph&#10;&#10;AI-generated content may be incorrect.">
+            <a:extLst>
+              <a:ext uri="{FF2B5EF4-FFF2-40B4-BE49-F238E27FC236}">
+                <a16:creationId xmlns:a16="http://schemas.microsoft.com/office/drawing/2014/main" id="{A0841157-F5AB-0774-7BAC-CE7B4C1A230C}"/>
+              </a:ext>
+            </a:extLst>
+          </p:cNvPr>
+          <p:cNvPicPr>
+            <a:picLocks noGrp="1" noChangeAspect="1"/>
+          </p:cNvPicPr>
+          <p:nvPr>
+            <p:ph idx="1"/>
+          </p:nvPr>
+        </p:nvPicPr>
+        <p:blipFill>
+          <a:blip r:embed="rId3">
+            <a:extLst>
+              <a:ext uri="{28A0092B-C50C-407E-A947-70E740481C1C}">
+                <a14:useLocalDpi xmlns:a14="http://schemas.microsoft.com/office/drawing/2010/main" val="0"/>
+              </a:ext>
+            </a:extLst>
+          </a:blip>
+          <a:srcRect l="32048" r="11415" b="4"/>
+          <a:stretch>
+            <a:fillRect/>
+          </a:stretch>
+        </p:blipFill>
+        <p:spPr>
+          <a:xfrm>
+            <a:off x="8412616" y="2559047"/>
+            <a:ext cx="2743620" cy="3639451"/>
           </a:xfrm>
           <a:prstGeom prst="rect">
             <a:avLst/>
@@ -4260,7 +4281,7 @@
     </p:spTree>
     <p:extLst>
       <p:ext uri="{BB962C8B-B14F-4D97-AF65-F5344CB8AC3E}">
-        <p14:creationId xmlns:p14="http://schemas.microsoft.com/office/powerpoint/2010/main" val="3129656432"/>
+        <p14:creationId xmlns:p14="http://schemas.microsoft.com/office/powerpoint/2010/main" val="3799872161"/>
       </p:ext>
     </p:extLst>
   </p:cSld>
@@ -4297,10 +4318,10 @@
       </p:grpSpPr>
       <p:sp useBgFill="1">
         <p:nvSpPr>
-          <p:cNvPr id="17" name="Rectangle 16">
-            <a:extLst>
-              <a:ext uri="{FF2B5EF4-FFF2-40B4-BE49-F238E27FC236}">
-                <a16:creationId xmlns:a16="http://schemas.microsoft.com/office/drawing/2014/main" id="{26CAED0A-2A45-4C9C-BCDD-21A8A092C5F3}"/>
+          <p:cNvPr id="10" name="Rectangle 9">
+            <a:extLst>
+              <a:ext uri="{FF2B5EF4-FFF2-40B4-BE49-F238E27FC236}">
+                <a16:creationId xmlns:a16="http://schemas.microsoft.com/office/drawing/2014/main" id="{058A14AF-9FB5-4CC7-BA35-E8E85D3EDF0E}"/>
               </a:ext>
               <a:ext uri="{C183D7F6-B498-43B3-948B-1728B52AA6E4}">
                 <adec:decorative xmlns:adec="http://schemas.microsoft.com/office/drawing/2017/decorative" val="1"/>
@@ -4360,7 +4381,7 @@
           <p:cNvPr id="2" name="Title 1">
             <a:extLst>
               <a:ext uri="{FF2B5EF4-FFF2-40B4-BE49-F238E27FC236}">
-                <a16:creationId xmlns:a16="http://schemas.microsoft.com/office/drawing/2014/main" id="{E77E6457-C4FF-4ADE-3F64-46F4A82DB9E2}"/>
+                <a16:creationId xmlns:a16="http://schemas.microsoft.com/office/drawing/2014/main" id="{2DF9E08C-1337-BDB0-6D31-3AE8EAC51C62}"/>
               </a:ext>
             </a:extLst>
           </p:cNvPr>
@@ -4378,28 +4399,21 @@
           </a:xfrm>
         </p:spPr>
         <p:txBody>
-          <a:bodyPr vert="horz" lIns="91440" tIns="45720" rIns="91440" bIns="45720" rtlCol="0" anchor="b">
+          <a:bodyPr anchor="b">
             <a:normAutofit/>
           </a:bodyPr>
           <a:lstStyle/>
           <a:p>
             <a:r>
-              <a:rPr lang="en-US" sz="4800" b="1" kern="1200">
-                <a:solidFill>
-                  <a:schemeClr val="tx1"/>
-                </a:solidFill>
-                <a:latin typeface="+mj-lt"/>
-                <a:ea typeface="+mj-ea"/>
-                <a:cs typeface="+mj-cs"/>
-              </a:rPr>
-              <a:t>Risk Profile &amp; Return Distribution</a:t>
-            </a:r>
-          </a:p>
-        </p:txBody>
-      </p:sp>
-      <p:sp>
-        <p:nvSpPr>
-          <p:cNvPr id="19" name="Rectangle 18">
+              <a:rPr lang="en-US" sz="4800" b="1"/>
+              <a:t>Inventory Stability</a:t>
+            </a:r>
+          </a:p>
+        </p:txBody>
+      </p:sp>
+      <p:sp>
+        <p:nvSpPr>
+          <p:cNvPr id="12" name="Rectangle 11">
             <a:extLst>
               <a:ext uri="{FF2B5EF4-FFF2-40B4-BE49-F238E27FC236}">
                 <a16:creationId xmlns:a16="http://schemas.microsoft.com/office/drawing/2014/main" id="{3A9A4357-BD1D-4622-A4FE-766E6AB8DE84}"/>
@@ -4462,7 +4476,7 @@
       </p:sp>
       <p:sp>
         <p:nvSpPr>
-          <p:cNvPr id="21" name="Rectangle 20">
+          <p:cNvPr id="14" name="Rectangle 13">
             <a:extLst>
               <a:ext uri="{FF2B5EF4-FFF2-40B4-BE49-F238E27FC236}">
                 <a16:creationId xmlns:a16="http://schemas.microsoft.com/office/drawing/2014/main" id="{E659831F-0D9A-4C63-9EBB-8435B85A440F}"/>
@@ -4532,70 +4546,57 @@
       </p:sp>
       <p:sp>
         <p:nvSpPr>
-          <p:cNvPr id="12" name="TextBox 11">
-            <a:extLst>
-              <a:ext uri="{FF2B5EF4-FFF2-40B4-BE49-F238E27FC236}">
-                <a16:creationId xmlns:a16="http://schemas.microsoft.com/office/drawing/2014/main" id="{2ADAFF66-64D9-C27E-A480-7FB701E80F16}"/>
-              </a:ext>
-            </a:extLst>
-          </p:cNvPr>
-          <p:cNvSpPr txBox="1"/>
-          <p:nvPr/>
+          <p:cNvPr id="3" name="Content Placeholder 2">
+            <a:extLst>
+              <a:ext uri="{FF2B5EF4-FFF2-40B4-BE49-F238E27FC236}">
+                <a16:creationId xmlns:a16="http://schemas.microsoft.com/office/drawing/2014/main" id="{60F0EB90-C826-1C56-45AE-E56EB4082199}"/>
+              </a:ext>
+            </a:extLst>
+          </p:cNvPr>
+          <p:cNvSpPr>
+            <a:spLocks noGrp="1"/>
+          </p:cNvSpPr>
+          <p:nvPr>
+            <p:ph idx="1"/>
+          </p:nvPr>
         </p:nvSpPr>
         <p:spPr>
           <a:xfrm>
-            <a:off x="793660" y="2599509"/>
-            <a:ext cx="4160725" cy="3598989"/>
-          </a:xfrm>
-          <a:prstGeom prst="rect">
-            <a:avLst/>
-          </a:prstGeom>
-        </p:spPr>
-        <p:txBody>
-          <a:bodyPr vert="horz" lIns="91440" tIns="45720" rIns="91440" bIns="45720" rtlCol="0" anchor="ctr">
+            <a:off x="793661" y="2599509"/>
+            <a:ext cx="4530898" cy="3639450"/>
+          </a:xfrm>
+        </p:spPr>
+        <p:txBody>
+          <a:bodyPr anchor="ctr">
             <a:normAutofit/>
           </a:bodyPr>
           <a:lstStyle/>
           <a:p>
-            <a:pPr marL="285750" indent="-228600">
-              <a:lnSpc>
-                <a:spcPct val="90000"/>
-              </a:lnSpc>
-              <a:spcAft>
-                <a:spcPts val="600"/>
-              </a:spcAft>
-              <a:buFont typeface="Arial" panose="020B0604020202020204" pitchFamily="34" charset="0"/>
-              <a:buChar char="•"/>
-            </a:pPr>
             <a:r>
               <a:rPr lang="en-US" sz="2000"/>
-              <a:t>Maximum drawdown remained low due to inventory-aware safeguards. </a:t>
-            </a:r>
-          </a:p>
-          <a:p>
-            <a:pPr marL="285750" indent="-228600">
-              <a:lnSpc>
-                <a:spcPct val="90000"/>
-              </a:lnSpc>
-              <a:spcAft>
-                <a:spcPts val="600"/>
-              </a:spcAft>
-              <a:buFont typeface="Arial" panose="020B0604020202020204" pitchFamily="34" charset="0"/>
-              <a:buChar char="•"/>
-            </a:pPr>
+              <a:t>ARL learned to keep inventory tightly controlled. </a:t>
+            </a:r>
+          </a:p>
+          <a:p>
             <a:r>
               <a:rPr lang="en-US" sz="2000"/>
-              <a:t>Return distribution is positively skewed; tail risks are suppressed.</a:t>
+              <a:t>Spread widening during high volatility prevented runaway exposure. </a:t>
+            </a:r>
+          </a:p>
+          <a:p>
+            <a:r>
+              <a:rPr lang="en-US" sz="2000"/>
+              <a:t>Inventory variance &lt; 0.02.</a:t>
             </a:r>
           </a:p>
         </p:txBody>
       </p:sp>
       <p:pic>
         <p:nvPicPr>
-          <p:cNvPr id="11" name="Picture 10" descr="A diagram of a distribution of step returns&#10;&#10;AI-generated content may be incorrect.">
-            <a:extLst>
-              <a:ext uri="{FF2B5EF4-FFF2-40B4-BE49-F238E27FC236}">
-                <a16:creationId xmlns:a16="http://schemas.microsoft.com/office/drawing/2014/main" id="{04C8F6B4-E99E-230D-EFA9-63C8E4E9D9E9}"/>
+          <p:cNvPr id="5" name="Picture 4" descr="A graph showing a number of data&#10;&#10;AI-generated content may be incorrect.">
+            <a:extLst>
+              <a:ext uri="{FF2B5EF4-FFF2-40B4-BE49-F238E27FC236}">
+                <a16:creationId xmlns:a16="http://schemas.microsoft.com/office/drawing/2014/main" id="{F32A8CAB-A74A-01D3-F570-6A87383E7286}"/>
               </a:ext>
             </a:extLst>
           </p:cNvPr>
@@ -4612,63 +4613,23 @@
               </a:ext>
             </a:extLst>
           </a:blip>
-          <a:srcRect l="18722" r="24778" b="4"/>
           <a:stretch>
             <a:fillRect/>
           </a:stretch>
         </p:blipFill>
         <p:spPr>
           <a:xfrm>
-            <a:off x="5418759" y="2559047"/>
-            <a:ext cx="2741805" cy="3639451"/>
+            <a:off x="5911532" y="2731914"/>
+            <a:ext cx="5150277" cy="3218926"/>
           </a:xfrm>
           <a:prstGeom prst="rect">
             <a:avLst/>
           </a:prstGeom>
         </p:spPr>
       </p:pic>
-      <p:pic>
-        <p:nvPicPr>
-          <p:cNvPr id="9" name="Content Placeholder 8" descr="A graph showing a graph&#10;&#10;AI-generated content may be incorrect.">
-            <a:extLst>
-              <a:ext uri="{FF2B5EF4-FFF2-40B4-BE49-F238E27FC236}">
-                <a16:creationId xmlns:a16="http://schemas.microsoft.com/office/drawing/2014/main" id="{A0841157-F5AB-0774-7BAC-CE7B4C1A230C}"/>
-              </a:ext>
-            </a:extLst>
-          </p:cNvPr>
-          <p:cNvPicPr>
-            <a:picLocks noGrp="1" noChangeAspect="1"/>
-          </p:cNvPicPr>
-          <p:nvPr>
-            <p:ph idx="1"/>
-          </p:nvPr>
-        </p:nvPicPr>
-        <p:blipFill>
-          <a:blip r:embed="rId3">
-            <a:extLst>
-              <a:ext uri="{28A0092B-C50C-407E-A947-70E740481C1C}">
-                <a14:useLocalDpi xmlns:a14="http://schemas.microsoft.com/office/drawing/2010/main" val="0"/>
-              </a:ext>
-            </a:extLst>
-          </a:blip>
-          <a:srcRect l="32048" r="11415" b="4"/>
-          <a:stretch>
-            <a:fillRect/>
-          </a:stretch>
-        </p:blipFill>
-        <p:spPr>
-          <a:xfrm>
-            <a:off x="8412616" y="2559047"/>
-            <a:ext cx="2743620" cy="3639451"/>
-          </a:xfrm>
-          <a:prstGeom prst="rect">
-            <a:avLst/>
-          </a:prstGeom>
-        </p:spPr>
-      </p:pic>
-      <p:sp>
-        <p:nvSpPr>
-          <p:cNvPr id="23" name="Rectangle 22">
+      <p:sp>
+        <p:nvSpPr>
+          <p:cNvPr id="16" name="Rectangle 15">
             <a:extLst>
               <a:ext uri="{FF2B5EF4-FFF2-40B4-BE49-F238E27FC236}">
                 <a16:creationId xmlns:a16="http://schemas.microsoft.com/office/drawing/2014/main" id="{E6995CE5-F890-4ABA-82A2-26507CE8D2A3}"/>
@@ -4732,7 +4693,7 @@
     </p:spTree>
     <p:extLst>
       <p:ext uri="{BB962C8B-B14F-4D97-AF65-F5344CB8AC3E}">
-        <p14:creationId xmlns:p14="http://schemas.microsoft.com/office/powerpoint/2010/main" val="3799872161"/>
+        <p14:creationId xmlns:p14="http://schemas.microsoft.com/office/powerpoint/2010/main" val="434229740"/>
       </p:ext>
     </p:extLst>
   </p:cSld>
@@ -4832,7 +4793,7 @@
           <p:cNvPr id="2" name="Title 1">
             <a:extLst>
               <a:ext uri="{FF2B5EF4-FFF2-40B4-BE49-F238E27FC236}">
-                <a16:creationId xmlns:a16="http://schemas.microsoft.com/office/drawing/2014/main" id="{2DF9E08C-1337-BDB0-6D31-3AE8EAC51C62}"/>
+                <a16:creationId xmlns:a16="http://schemas.microsoft.com/office/drawing/2014/main" id="{6BA3617D-5C5D-90D4-7FA6-AF2D86211F30}"/>
               </a:ext>
             </a:extLst>
           </p:cNvPr>
@@ -4857,7 +4818,7 @@
           <a:p>
             <a:r>
               <a:rPr lang="en-US" sz="4800" b="1"/>
-              <a:t>Inventory Stability</a:t>
+              <a:t>Policy Behavior &amp; Learned Strategy</a:t>
             </a:r>
           </a:p>
         </p:txBody>
@@ -5000,7 +4961,7 @@
           <p:cNvPr id="3" name="Content Placeholder 2">
             <a:extLst>
               <a:ext uri="{FF2B5EF4-FFF2-40B4-BE49-F238E27FC236}">
-                <a16:creationId xmlns:a16="http://schemas.microsoft.com/office/drawing/2014/main" id="{60F0EB90-C826-1C56-45AE-E56EB4082199}"/>
+                <a16:creationId xmlns:a16="http://schemas.microsoft.com/office/drawing/2014/main" id="{13FE6EC4-0180-CA9F-9562-2750BAB8A153}"/>
               </a:ext>
             </a:extLst>
           </p:cNvPr>
@@ -5025,29 +4986,41 @@
           <a:p>
             <a:r>
               <a:rPr lang="en-US" sz="2000"/>
-              <a:t>ARL learned to keep inventory tightly controlled. </a:t>
+              <a:t>Observed Behavioral Patterns </a:t>
             </a:r>
           </a:p>
           <a:p>
             <a:r>
               <a:rPr lang="en-US" sz="2000"/>
-              <a:t>Spread widening during high volatility prevented runaway exposure. </a:t>
+              <a:t>Tight spreads when volatility is low and inventory is near zero</a:t>
             </a:r>
           </a:p>
           <a:p>
             <a:r>
               <a:rPr lang="en-US" sz="2000"/>
-              <a:t>Inventory variance &lt; 0.02.</a:t>
+              <a:t>Wider spreads when EGT becomes aggressive </a:t>
+            </a:r>
+          </a:p>
+          <a:p>
+            <a:r>
+              <a:rPr lang="en-US" sz="2000"/>
+              <a:t>Stable quoting during passive EGT regimes</a:t>
+            </a:r>
+          </a:p>
+          <a:p>
+            <a:r>
+              <a:rPr lang="en-US" sz="2000"/>
+              <a:t>Reinforces that ARL learned context-dependent microstructure tactics.</a:t>
             </a:r>
           </a:p>
         </p:txBody>
       </p:sp>
       <p:pic>
         <p:nvPicPr>
-          <p:cNvPr id="5" name="Picture 4" descr="A graph showing a number of data&#10;&#10;AI-generated content may be incorrect.">
-            <a:extLst>
-              <a:ext uri="{FF2B5EF4-FFF2-40B4-BE49-F238E27FC236}">
-                <a16:creationId xmlns:a16="http://schemas.microsoft.com/office/drawing/2014/main" id="{F32A8CAB-A74A-01D3-F570-6A87383E7286}"/>
+          <p:cNvPr id="5" name="Picture 4" descr="A graph with different colored bars&#10;&#10;AI-generated content may be incorrect.">
+            <a:extLst>
+              <a:ext uri="{FF2B5EF4-FFF2-40B4-BE49-F238E27FC236}">
+                <a16:creationId xmlns:a16="http://schemas.microsoft.com/office/drawing/2014/main" id="{67DCFD4C-D355-48C4-638C-AD9233B3C685}"/>
               </a:ext>
             </a:extLst>
           </p:cNvPr>
@@ -5070,8 +5043,8 @@
         </p:blipFill>
         <p:spPr>
           <a:xfrm>
-            <a:off x="5911532" y="2731914"/>
-            <a:ext cx="5150277" cy="3218926"/>
+            <a:off x="6010509" y="2484255"/>
+            <a:ext cx="4952322" cy="3714244"/>
           </a:xfrm>
           <a:prstGeom prst="rect">
             <a:avLst/>
@@ -5144,7 +5117,7 @@
     </p:spTree>
     <p:extLst>
       <p:ext uri="{BB962C8B-B14F-4D97-AF65-F5344CB8AC3E}">
-        <p14:creationId xmlns:p14="http://schemas.microsoft.com/office/powerpoint/2010/main" val="434229740"/>
+        <p14:creationId xmlns:p14="http://schemas.microsoft.com/office/powerpoint/2010/main" val="1205668723"/>
       </p:ext>
     </p:extLst>
   </p:cSld>
@@ -5155,430 +5128,6 @@
 </file>
 
 <file path=ppt/slides/slide13.xml><?xml version="1.0" encoding="utf-8"?>
-<p:sld xmlns:a="http://schemas.openxmlformats.org/drawingml/2006/main" xmlns:r="http://schemas.openxmlformats.org/officeDocument/2006/relationships" xmlns:p="http://schemas.openxmlformats.org/presentationml/2006/main">
-  <p:cSld>
-    <p:bg>
-      <p:bgPr>
-        <a:solidFill>
-          <a:schemeClr val="bg1"/>
-        </a:solidFill>
-        <a:effectLst/>
-      </p:bgPr>
-    </p:bg>
-    <p:spTree>
-      <p:nvGrpSpPr>
-        <p:cNvPr id="1" name=""/>
-        <p:cNvGrpSpPr/>
-        <p:nvPr/>
-      </p:nvGrpSpPr>
-      <p:grpSpPr>
-        <a:xfrm>
-          <a:off x="0" y="0"/>
-          <a:ext cx="0" cy="0"/>
-          <a:chOff x="0" y="0"/>
-          <a:chExt cx="0" cy="0"/>
-        </a:xfrm>
-      </p:grpSpPr>
-      <p:sp useBgFill="1">
-        <p:nvSpPr>
-          <p:cNvPr id="10" name="Rectangle 9">
-            <a:extLst>
-              <a:ext uri="{FF2B5EF4-FFF2-40B4-BE49-F238E27FC236}">
-                <a16:creationId xmlns:a16="http://schemas.microsoft.com/office/drawing/2014/main" id="{058A14AF-9FB5-4CC7-BA35-E8E85D3EDF0E}"/>
-              </a:ext>
-              <a:ext uri="{C183D7F6-B498-43B3-948B-1728B52AA6E4}">
-                <adec:decorative xmlns:adec="http://schemas.microsoft.com/office/drawing/2017/decorative" val="1"/>
-              </a:ext>
-            </a:extLst>
-          </p:cNvPr>
-          <p:cNvSpPr>
-            <a:spLocks noGrp="1" noRot="1" noChangeAspect="1" noMove="1" noResize="1" noEditPoints="1" noAdjustHandles="1" noChangeArrowheads="1" noChangeShapeType="1" noTextEdit="1"/>
-          </p:cNvSpPr>
-          <p:nvPr>
-            <p:extLst>
-              <p:ext uri="{386F3935-93C4-4BCD-93E2-E3B085C9AB24}">
-                <p16:designElem xmlns:p16="http://schemas.microsoft.com/office/powerpoint/2015/main" val="1"/>
-              </p:ext>
-            </p:extLst>
-          </p:nvPr>
-        </p:nvSpPr>
-        <p:spPr>
-          <a:xfrm>
-            <a:off x="0" y="0"/>
-            <a:ext cx="12191999" cy="6857365"/>
-          </a:xfrm>
-          <a:prstGeom prst="rect">
-            <a:avLst/>
-          </a:prstGeom>
-          <a:ln>
-            <a:noFill/>
-          </a:ln>
-        </p:spPr>
-        <p:style>
-          <a:lnRef idx="2">
-            <a:schemeClr val="accent1">
-              <a:shade val="50000"/>
-            </a:schemeClr>
-          </a:lnRef>
-          <a:fillRef idx="1">
-            <a:schemeClr val="accent1"/>
-          </a:fillRef>
-          <a:effectRef idx="0">
-            <a:schemeClr val="accent1"/>
-          </a:effectRef>
-          <a:fontRef idx="minor">
-            <a:schemeClr val="lt1"/>
-          </a:fontRef>
-        </p:style>
-        <p:txBody>
-          <a:bodyPr rtlCol="0" anchor="ctr"/>
-          <a:lstStyle/>
-          <a:p>
-            <a:pPr algn="ctr"/>
-            <a:endParaRPr lang="en-US"/>
-          </a:p>
-        </p:txBody>
-      </p:sp>
-      <p:sp>
-        <p:nvSpPr>
-          <p:cNvPr id="2" name="Title 1">
-            <a:extLst>
-              <a:ext uri="{FF2B5EF4-FFF2-40B4-BE49-F238E27FC236}">
-                <a16:creationId xmlns:a16="http://schemas.microsoft.com/office/drawing/2014/main" id="{6BA3617D-5C5D-90D4-7FA6-AF2D86211F30}"/>
-              </a:ext>
-            </a:extLst>
-          </p:cNvPr>
-          <p:cNvSpPr>
-            <a:spLocks noGrp="1"/>
-          </p:cNvSpPr>
-          <p:nvPr>
-            <p:ph type="title"/>
-          </p:nvPr>
-        </p:nvSpPr>
-        <p:spPr>
-          <a:xfrm>
-            <a:off x="793662" y="386930"/>
-            <a:ext cx="10066122" cy="1298448"/>
-          </a:xfrm>
-        </p:spPr>
-        <p:txBody>
-          <a:bodyPr anchor="b">
-            <a:normAutofit/>
-          </a:bodyPr>
-          <a:lstStyle/>
-          <a:p>
-            <a:r>
-              <a:rPr lang="en-US" sz="4800" b="1"/>
-              <a:t>Policy Behavior &amp; Learned Strategy</a:t>
-            </a:r>
-          </a:p>
-        </p:txBody>
-      </p:sp>
-      <p:sp>
-        <p:nvSpPr>
-          <p:cNvPr id="12" name="Rectangle 11">
-            <a:extLst>
-              <a:ext uri="{FF2B5EF4-FFF2-40B4-BE49-F238E27FC236}">
-                <a16:creationId xmlns:a16="http://schemas.microsoft.com/office/drawing/2014/main" id="{3A9A4357-BD1D-4622-A4FE-766E6AB8DE84}"/>
-              </a:ext>
-              <a:ext uri="{C183D7F6-B498-43B3-948B-1728B52AA6E4}">
-                <adec:decorative xmlns:adec="http://schemas.microsoft.com/office/drawing/2017/decorative" val="1"/>
-              </a:ext>
-            </a:extLst>
-          </p:cNvPr>
-          <p:cNvSpPr>
-            <a:spLocks noGrp="1" noRot="1" noChangeAspect="1" noMove="1" noResize="1" noEditPoints="1" noAdjustHandles="1" noChangeArrowheads="1" noChangeShapeType="1" noTextEdit="1"/>
-          </p:cNvSpPr>
-          <p:nvPr>
-            <p:extLst>
-              <p:ext uri="{386F3935-93C4-4BCD-93E2-E3B085C9AB24}">
-                <p16:designElem xmlns:p16="http://schemas.microsoft.com/office/powerpoint/2015/main" val="1"/>
-              </p:ext>
-            </p:extLst>
-          </p:nvPr>
-        </p:nvSpPr>
-        <p:spPr>
-          <a:xfrm flipH="1" flipV="1">
-            <a:off x="-2" y="1998845"/>
-            <a:ext cx="11454595" cy="781699"/>
-          </a:xfrm>
-          <a:prstGeom prst="rect">
-            <a:avLst/>
-          </a:prstGeom>
-          <a:solidFill>
-            <a:schemeClr val="accent4"/>
-          </a:solidFill>
-          <a:ln>
-            <a:noFill/>
-          </a:ln>
-        </p:spPr>
-        <p:style>
-          <a:lnRef idx="2">
-            <a:schemeClr val="accent1">
-              <a:shade val="50000"/>
-            </a:schemeClr>
-          </a:lnRef>
-          <a:fillRef idx="1">
-            <a:schemeClr val="accent1"/>
-          </a:fillRef>
-          <a:effectRef idx="0">
-            <a:schemeClr val="accent1"/>
-          </a:effectRef>
-          <a:fontRef idx="minor">
-            <a:schemeClr val="lt1"/>
-          </a:fontRef>
-        </p:style>
-        <p:txBody>
-          <a:bodyPr rtlCol="0" anchor="ctr"/>
-          <a:lstStyle/>
-          <a:p>
-            <a:pPr algn="ctr"/>
-            <a:endParaRPr lang="en-US"/>
-          </a:p>
-        </p:txBody>
-      </p:sp>
-      <p:sp>
-        <p:nvSpPr>
-          <p:cNvPr id="14" name="Rectangle 13">
-            <a:extLst>
-              <a:ext uri="{FF2B5EF4-FFF2-40B4-BE49-F238E27FC236}">
-                <a16:creationId xmlns:a16="http://schemas.microsoft.com/office/drawing/2014/main" id="{E659831F-0D9A-4C63-9EBB-8435B85A440F}"/>
-              </a:ext>
-              <a:ext uri="{C183D7F6-B498-43B3-948B-1728B52AA6E4}">
-                <adec:decorative xmlns:adec="http://schemas.microsoft.com/office/drawing/2017/decorative" val="1"/>
-              </a:ext>
-            </a:extLst>
-          </p:cNvPr>
-          <p:cNvSpPr>
-            <a:spLocks noGrp="1" noRot="1" noChangeAspect="1" noMove="1" noResize="1" noEditPoints="1" noAdjustHandles="1" noChangeArrowheads="1" noChangeShapeType="1" noTextEdit="1"/>
-          </p:cNvSpPr>
-          <p:nvPr>
-            <p:extLst>
-              <p:ext uri="{386F3935-93C4-4BCD-93E2-E3B085C9AB24}">
-                <p16:designElem xmlns:p16="http://schemas.microsoft.com/office/powerpoint/2015/main" val="1"/>
-              </p:ext>
-            </p:extLst>
-          </p:nvPr>
-        </p:nvSpPr>
-        <p:spPr>
-          <a:xfrm>
-            <a:off x="0" y="2203079"/>
-            <a:ext cx="11383362" cy="4267991"/>
-          </a:xfrm>
-          <a:prstGeom prst="rect">
-            <a:avLst/>
-          </a:prstGeom>
-          <a:solidFill>
-            <a:schemeClr val="bg1"/>
-          </a:solidFill>
-          <a:ln>
-            <a:noFill/>
-          </a:ln>
-          <a:effectLst>
-            <a:outerShdw blurRad="139700" dist="127000" dir="5400000" algn="t" rotWithShape="0">
-              <a:prstClr val="black">
-                <a:alpha val="15000"/>
-              </a:prstClr>
-            </a:outerShdw>
-          </a:effectLst>
-        </p:spPr>
-        <p:style>
-          <a:lnRef idx="2">
-            <a:schemeClr val="accent1">
-              <a:shade val="50000"/>
-            </a:schemeClr>
-          </a:lnRef>
-          <a:fillRef idx="1">
-            <a:schemeClr val="accent1"/>
-          </a:fillRef>
-          <a:effectRef idx="0">
-            <a:schemeClr val="accent1"/>
-          </a:effectRef>
-          <a:fontRef idx="minor">
-            <a:schemeClr val="lt1"/>
-          </a:fontRef>
-        </p:style>
-        <p:txBody>
-          <a:bodyPr rtlCol="0" anchor="ctr"/>
-          <a:lstStyle/>
-          <a:p>
-            <a:pPr algn="ctr"/>
-            <a:endParaRPr lang="en-US"/>
-          </a:p>
-        </p:txBody>
-      </p:sp>
-      <p:sp>
-        <p:nvSpPr>
-          <p:cNvPr id="3" name="Content Placeholder 2">
-            <a:extLst>
-              <a:ext uri="{FF2B5EF4-FFF2-40B4-BE49-F238E27FC236}">
-                <a16:creationId xmlns:a16="http://schemas.microsoft.com/office/drawing/2014/main" id="{13FE6EC4-0180-CA9F-9562-2750BAB8A153}"/>
-              </a:ext>
-            </a:extLst>
-          </p:cNvPr>
-          <p:cNvSpPr>
-            <a:spLocks noGrp="1"/>
-          </p:cNvSpPr>
-          <p:nvPr>
-            <p:ph idx="1"/>
-          </p:nvPr>
-        </p:nvSpPr>
-        <p:spPr>
-          <a:xfrm>
-            <a:off x="793661" y="2599509"/>
-            <a:ext cx="4530898" cy="3639450"/>
-          </a:xfrm>
-        </p:spPr>
-        <p:txBody>
-          <a:bodyPr anchor="ctr">
-            <a:normAutofit/>
-          </a:bodyPr>
-          <a:lstStyle/>
-          <a:p>
-            <a:r>
-              <a:rPr lang="en-US" sz="2000"/>
-              <a:t>Observed Behavioral Patterns </a:t>
-            </a:r>
-          </a:p>
-          <a:p>
-            <a:r>
-              <a:rPr lang="en-US" sz="2000"/>
-              <a:t>Tight spreads when volatility is low and inventory is near zero</a:t>
-            </a:r>
-          </a:p>
-          <a:p>
-            <a:r>
-              <a:rPr lang="en-US" sz="2000"/>
-              <a:t>Wider spreads when EGT becomes aggressive </a:t>
-            </a:r>
-          </a:p>
-          <a:p>
-            <a:r>
-              <a:rPr lang="en-US" sz="2000"/>
-              <a:t>Stable quoting during passive EGT regimes</a:t>
-            </a:r>
-          </a:p>
-          <a:p>
-            <a:r>
-              <a:rPr lang="en-US" sz="2000"/>
-              <a:t>Reinforces that ARL learned context-dependent microstructure tactics.</a:t>
-            </a:r>
-          </a:p>
-        </p:txBody>
-      </p:sp>
-      <p:pic>
-        <p:nvPicPr>
-          <p:cNvPr id="5" name="Picture 4" descr="A graph with different colored bars&#10;&#10;AI-generated content may be incorrect.">
-            <a:extLst>
-              <a:ext uri="{FF2B5EF4-FFF2-40B4-BE49-F238E27FC236}">
-                <a16:creationId xmlns:a16="http://schemas.microsoft.com/office/drawing/2014/main" id="{67DCFD4C-D355-48C4-638C-AD9233B3C685}"/>
-              </a:ext>
-            </a:extLst>
-          </p:cNvPr>
-          <p:cNvPicPr>
-            <a:picLocks noChangeAspect="1"/>
-          </p:cNvPicPr>
-          <p:nvPr/>
-        </p:nvPicPr>
-        <p:blipFill>
-          <a:blip r:embed="rId2">
-            <a:extLst>
-              <a:ext uri="{28A0092B-C50C-407E-A947-70E740481C1C}">
-                <a14:useLocalDpi xmlns:a14="http://schemas.microsoft.com/office/drawing/2010/main" val="0"/>
-              </a:ext>
-            </a:extLst>
-          </a:blip>
-          <a:stretch>
-            <a:fillRect/>
-          </a:stretch>
-        </p:blipFill>
-        <p:spPr>
-          <a:xfrm>
-            <a:off x="6010509" y="2484255"/>
-            <a:ext cx="4952322" cy="3714244"/>
-          </a:xfrm>
-          <a:prstGeom prst="rect">
-            <a:avLst/>
-          </a:prstGeom>
-        </p:spPr>
-      </p:pic>
-      <p:sp>
-        <p:nvSpPr>
-          <p:cNvPr id="16" name="Rectangle 15">
-            <a:extLst>
-              <a:ext uri="{FF2B5EF4-FFF2-40B4-BE49-F238E27FC236}">
-                <a16:creationId xmlns:a16="http://schemas.microsoft.com/office/drawing/2014/main" id="{E6995CE5-F890-4ABA-82A2-26507CE8D2A3}"/>
-              </a:ext>
-              <a:ext uri="{C183D7F6-B498-43B3-948B-1728B52AA6E4}">
-                <adec:decorative xmlns:adec="http://schemas.microsoft.com/office/drawing/2017/decorative" val="1"/>
-              </a:ext>
-            </a:extLst>
-          </p:cNvPr>
-          <p:cNvSpPr>
-            <a:spLocks noGrp="1" noRot="1" noChangeAspect="1" noMove="1" noResize="1" noEditPoints="1" noAdjustHandles="1" noChangeArrowheads="1" noChangeShapeType="1" noTextEdit="1"/>
-          </p:cNvSpPr>
-          <p:nvPr>
-            <p:extLst>
-              <p:ext uri="{386F3935-93C4-4BCD-93E2-E3B085C9AB24}">
-                <p16:designElem xmlns:p16="http://schemas.microsoft.com/office/powerpoint/2015/main" val="1"/>
-              </p:ext>
-            </p:extLst>
-          </p:nvPr>
-        </p:nvSpPr>
-        <p:spPr>
-          <a:xfrm rot="5400000">
-            <a:off x="11228040" y="2313027"/>
-            <a:ext cx="781700" cy="152382"/>
-          </a:xfrm>
-          <a:prstGeom prst="rect">
-            <a:avLst/>
-          </a:prstGeom>
-          <a:solidFill>
-            <a:schemeClr val="accent4"/>
-          </a:solidFill>
-          <a:ln>
-            <a:noFill/>
-          </a:ln>
-        </p:spPr>
-        <p:style>
-          <a:lnRef idx="2">
-            <a:schemeClr val="accent1">
-              <a:shade val="50000"/>
-            </a:schemeClr>
-          </a:lnRef>
-          <a:fillRef idx="1">
-            <a:schemeClr val="accent1"/>
-          </a:fillRef>
-          <a:effectRef idx="0">
-            <a:schemeClr val="accent1"/>
-          </a:effectRef>
-          <a:fontRef idx="minor">
-            <a:schemeClr val="lt1"/>
-          </a:fontRef>
-        </p:style>
-        <p:txBody>
-          <a:bodyPr rtlCol="0" anchor="ctr"/>
-          <a:lstStyle/>
-          <a:p>
-            <a:pPr algn="ctr"/>
-            <a:endParaRPr lang="en-US"/>
-          </a:p>
-        </p:txBody>
-      </p:sp>
-    </p:spTree>
-    <p:extLst>
-      <p:ext uri="{BB962C8B-B14F-4D97-AF65-F5344CB8AC3E}">
-        <p14:creationId xmlns:p14="http://schemas.microsoft.com/office/powerpoint/2010/main" val="1205668723"/>
-      </p:ext>
-    </p:extLst>
-  </p:cSld>
-  <p:clrMapOvr>
-    <a:masterClrMapping/>
-  </p:clrMapOvr>
-</p:sld>
-</file>
-
-<file path=ppt/slides/slide14.xml><?xml version="1.0" encoding="utf-8"?>
 <p:sld xmlns:a="http://schemas.openxmlformats.org/drawingml/2006/main" xmlns:r="http://schemas.openxmlformats.org/officeDocument/2006/relationships" xmlns:p="http://schemas.openxmlformats.org/presentationml/2006/main">
   <p:cSld>
     <p:bg>
@@ -6058,7 +5607,7 @@
 </p:sld>
 </file>
 
-<file path=ppt/slides/slide15.xml><?xml version="1.0" encoding="utf-8"?>
+<file path=ppt/slides/slide14.xml><?xml version="1.0" encoding="utf-8"?>
 <p:sld xmlns:a="http://schemas.openxmlformats.org/drawingml/2006/main" xmlns:r="http://schemas.openxmlformats.org/officeDocument/2006/relationships" xmlns:p="http://schemas.openxmlformats.org/presentationml/2006/main">
   <p:cSld>
     <p:bg>
@@ -6510,7 +6059,7 @@
 </p:sld>
 </file>
 
-<file path=ppt/slides/slide16.xml><?xml version="1.0" encoding="utf-8"?>
+<file path=ppt/slides/slide15.xml><?xml version="1.0" encoding="utf-8"?>
 <p:sld xmlns:a="http://schemas.openxmlformats.org/drawingml/2006/main" xmlns:r="http://schemas.openxmlformats.org/officeDocument/2006/relationships" xmlns:p="http://schemas.openxmlformats.org/presentationml/2006/main">
   <p:cSld>
     <p:spTree>
@@ -9295,7 +8844,7 @@
           <p:cNvPr id="2" name="Title 1">
             <a:extLst>
               <a:ext uri="{FF2B5EF4-FFF2-40B4-BE49-F238E27FC236}">
-                <a16:creationId xmlns:a16="http://schemas.microsoft.com/office/drawing/2014/main" id="{76615CC0-D6B8-6ACA-747A-6B7122105529}"/>
+                <a16:creationId xmlns:a16="http://schemas.microsoft.com/office/drawing/2014/main" id="{90A1F16A-0DDF-2A09-4C54-EAF3E3158767}"/>
               </a:ext>
             </a:extLst>
           </p:cNvPr>
@@ -9319,9 +8868,10 @@
           <a:lstStyle/>
           <a:p>
             <a:r>
-              <a:rPr lang="en-US" sz="4100" b="1"/>
-              <a:t>ARL and EGT Co-Adaptation and Influence</a:t>
-            </a:r>
+              <a:rPr lang="en-US" b="1" dirty="0"/>
+              <a:t>Detailed Influence Between ARL &amp; EGT</a:t>
+            </a:r>
+            <a:endParaRPr lang="en-US" dirty="0"/>
           </a:p>
         </p:txBody>
       </p:sp>
@@ -9463,7 +9013,7 @@
           <p:cNvPr id="3" name="Content Placeholder 2">
             <a:extLst>
               <a:ext uri="{FF2B5EF4-FFF2-40B4-BE49-F238E27FC236}">
-                <a16:creationId xmlns:a16="http://schemas.microsoft.com/office/drawing/2014/main" id="{3918A197-E6E5-D98D-9A4A-B1A12635617C}"/>
+                <a16:creationId xmlns:a16="http://schemas.microsoft.com/office/drawing/2014/main" id="{02716AD3-5A45-82AD-5B2D-4809D953D6AA}"/>
               </a:ext>
             </a:extLst>
           </p:cNvPr>
@@ -9487,25 +9037,33 @@
           <a:lstStyle/>
           <a:p>
             <a:r>
-              <a:rPr lang="en-US" sz="2000" dirty="0"/>
-              <a:t>ARL → EGT: Tight spreads temporarily boost Aggressive strategy fitness. </a:t>
-            </a:r>
-          </a:p>
-          <a:p>
-            <a:r>
-              <a:rPr lang="en-US" sz="2000" dirty="0"/>
-              <a:t>EGT → ARL: When Aggressive dominates, ARL widens spreads to reduce risk. </a:t>
-            </a:r>
-          </a:p>
-          <a:p>
-            <a:r>
-              <a:rPr lang="en-US" sz="2000" dirty="0"/>
-              <a:t>Passive traders eventually dominate (&gt;99%) due to ARL pressure. </a:t>
-            </a:r>
-          </a:p>
-          <a:p>
-            <a:r>
-              <a:rPr lang="en-US" sz="2000" dirty="0"/>
+              <a:rPr lang="en-US" sz="2000" b="1"/>
+              <a:t>ARL → EGT:</a:t>
+            </a:r>
+            <a:r>
+              <a:rPr lang="en-US" sz="2000"/>
+              <a:t> Tight spreads temporarily boost Aggressive strategy fitness.</a:t>
+            </a:r>
+          </a:p>
+          <a:p>
+            <a:r>
+              <a:rPr lang="en-US" sz="2000" b="1"/>
+              <a:t>EGT → ARL:</a:t>
+            </a:r>
+            <a:r>
+              <a:rPr lang="en-US" sz="2000"/>
+              <a:t> When Aggressive dominates, ARL widens spreads to reduce risk.</a:t>
+            </a:r>
+          </a:p>
+          <a:p>
+            <a:r>
+              <a:rPr lang="en-US" sz="2000"/>
+              <a:t>Passive traders eventually dominate (&gt;99%) due to ARL pressure.</a:t>
+            </a:r>
+          </a:p>
+          <a:p>
+            <a:r>
+              <a:rPr lang="en-US" sz="2000"/>
               <a:t>Clear feedback loop emerges: each agent type shapes the other’s behavior.</a:t>
             </a:r>
           </a:p>
@@ -9516,7 +9074,7 @@
           <p:cNvPr id="5" name="Picture 4" descr="A graph with orange lines&#10;&#10;AI-generated content may be incorrect.">
             <a:extLst>
               <a:ext uri="{FF2B5EF4-FFF2-40B4-BE49-F238E27FC236}">
-                <a16:creationId xmlns:a16="http://schemas.microsoft.com/office/drawing/2014/main" id="{9BD73CC6-A6D8-7737-ED7E-E741BCD0D68C}"/>
+                <a16:creationId xmlns:a16="http://schemas.microsoft.com/office/drawing/2014/main" id="{24A44C00-F34C-5EE0-1D65-91DEFDE21548}"/>
               </a:ext>
             </a:extLst>
           </p:cNvPr>
@@ -9613,7 +9171,7 @@
     </p:spTree>
     <p:extLst>
       <p:ext uri="{BB962C8B-B14F-4D97-AF65-F5344CB8AC3E}">
-        <p14:creationId xmlns:p14="http://schemas.microsoft.com/office/powerpoint/2010/main" val="3743521334"/>
+        <p14:creationId xmlns:p14="http://schemas.microsoft.com/office/powerpoint/2010/main" val="3502722188"/>
       </p:ext>
     </p:extLst>
   </p:cSld>
@@ -9650,7 +9208,7 @@
       </p:grpSpPr>
       <p:sp useBgFill="1">
         <p:nvSpPr>
-          <p:cNvPr id="10" name="Rectangle 9">
+          <p:cNvPr id="17" name="Rectangle 16">
             <a:extLst>
               <a:ext uri="{FF2B5EF4-FFF2-40B4-BE49-F238E27FC236}">
                 <a16:creationId xmlns:a16="http://schemas.microsoft.com/office/drawing/2014/main" id="{058A14AF-9FB5-4CC7-BA35-E8E85D3EDF0E}"/>
@@ -9713,7 +9271,7 @@
           <p:cNvPr id="2" name="Title 1">
             <a:extLst>
               <a:ext uri="{FF2B5EF4-FFF2-40B4-BE49-F238E27FC236}">
-                <a16:creationId xmlns:a16="http://schemas.microsoft.com/office/drawing/2014/main" id="{90A1F16A-0DDF-2A09-4C54-EAF3E3158767}"/>
+                <a16:creationId xmlns:a16="http://schemas.microsoft.com/office/drawing/2014/main" id="{823E44DC-3740-2D30-28C6-24C3DA4C87D6}"/>
               </a:ext>
             </a:extLst>
           </p:cNvPr>
@@ -9731,22 +9289,28 @@
           </a:xfrm>
         </p:spPr>
         <p:txBody>
-          <a:bodyPr anchor="b">
+          <a:bodyPr vert="horz" lIns="91440" tIns="45720" rIns="91440" bIns="45720" rtlCol="0" anchor="b">
             <a:normAutofit/>
           </a:bodyPr>
           <a:lstStyle/>
           <a:p>
             <a:r>
-              <a:rPr lang="en-US" b="1" dirty="0"/>
-              <a:t>Detailed Influence Between ARL &amp; EGT</a:t>
-            </a:r>
-            <a:endParaRPr lang="en-US" dirty="0"/>
-          </a:p>
-        </p:txBody>
-      </p:sp>
-      <p:sp>
-        <p:nvSpPr>
-          <p:cNvPr id="12" name="Rectangle 11">
+              <a:rPr lang="en-US" sz="4800" b="1" kern="1200">
+                <a:solidFill>
+                  <a:schemeClr val="tx1"/>
+                </a:solidFill>
+                <a:latin typeface="+mj-lt"/>
+                <a:ea typeface="+mj-ea"/>
+                <a:cs typeface="+mj-cs"/>
+              </a:rPr>
+              <a:t>Overall Portfolio Performance</a:t>
+            </a:r>
+          </a:p>
+        </p:txBody>
+      </p:sp>
+      <p:sp>
+        <p:nvSpPr>
+          <p:cNvPr id="19" name="Rectangle 18">
             <a:extLst>
               <a:ext uri="{FF2B5EF4-FFF2-40B4-BE49-F238E27FC236}">
                 <a16:creationId xmlns:a16="http://schemas.microsoft.com/office/drawing/2014/main" id="{3A9A4357-BD1D-4622-A4FE-766E6AB8DE84}"/>
@@ -9809,7 +9373,7 @@
       </p:sp>
       <p:sp>
         <p:nvSpPr>
-          <p:cNvPr id="14" name="Rectangle 13">
+          <p:cNvPr id="21" name="Rectangle 20">
             <a:extLst>
               <a:ext uri="{FF2B5EF4-FFF2-40B4-BE49-F238E27FC236}">
                 <a16:creationId xmlns:a16="http://schemas.microsoft.com/office/drawing/2014/main" id="{E659831F-0D9A-4C63-9EBB-8435B85A440F}"/>
@@ -9879,78 +9443,95 @@
       </p:sp>
       <p:sp>
         <p:nvSpPr>
-          <p:cNvPr id="3" name="Content Placeholder 2">
-            <a:extLst>
-              <a:ext uri="{FF2B5EF4-FFF2-40B4-BE49-F238E27FC236}">
-                <a16:creationId xmlns:a16="http://schemas.microsoft.com/office/drawing/2014/main" id="{02716AD3-5A45-82AD-5B2D-4809D953D6AA}"/>
-              </a:ext>
-            </a:extLst>
-          </p:cNvPr>
-          <p:cNvSpPr>
-            <a:spLocks noGrp="1"/>
-          </p:cNvSpPr>
-          <p:nvPr>
-            <p:ph idx="1"/>
-          </p:nvPr>
+          <p:cNvPr id="12" name="TextBox 11">
+            <a:extLst>
+              <a:ext uri="{FF2B5EF4-FFF2-40B4-BE49-F238E27FC236}">
+                <a16:creationId xmlns:a16="http://schemas.microsoft.com/office/drawing/2014/main" id="{0E232222-CC7F-C3F9-1C47-10C613A35555}"/>
+              </a:ext>
+            </a:extLst>
+          </p:cNvPr>
+          <p:cNvSpPr txBox="1"/>
+          <p:nvPr/>
         </p:nvSpPr>
         <p:spPr>
           <a:xfrm>
             <a:off x="793661" y="2599509"/>
             <a:ext cx="4530898" cy="3639450"/>
           </a:xfrm>
-        </p:spPr>
-        <p:txBody>
-          <a:bodyPr anchor="ctr">
+          <a:prstGeom prst="rect">
+            <a:avLst/>
+          </a:prstGeom>
+        </p:spPr>
+        <p:txBody>
+          <a:bodyPr vert="horz" lIns="91440" tIns="45720" rIns="91440" bIns="45720" rtlCol="0" anchor="ctr">
             <a:normAutofit/>
           </a:bodyPr>
           <a:lstStyle/>
           <a:p>
-            <a:r>
-              <a:rPr lang="en-US" sz="2000" b="1"/>
-              <a:t>ARL → EGT:</a:t>
-            </a:r>
+            <a:pPr marL="285750" indent="-228600">
+              <a:lnSpc>
+                <a:spcPct val="90000"/>
+              </a:lnSpc>
+              <a:spcAft>
+                <a:spcPts val="600"/>
+              </a:spcAft>
+              <a:buFont typeface="Arial" panose="020B0604020202020204" pitchFamily="34" charset="0"/>
+              <a:buChar char="•"/>
+            </a:pPr>
             <a:r>
               <a:rPr lang="en-US" sz="2000"/>
-              <a:t> Tight spreads temporarily boost Aggressive strategy fitness.</a:t>
-            </a:r>
-          </a:p>
-          <a:p>
-            <a:r>
-              <a:rPr lang="en-US" sz="2000" b="1"/>
-              <a:t>EGT → ARL:</a:t>
-            </a:r>
+              <a:t>ARL achieved positive total returns (~1.5%). </a:t>
+            </a:r>
+          </a:p>
+          <a:p>
+            <a:pPr marL="285750" indent="-228600">
+              <a:lnSpc>
+                <a:spcPct val="90000"/>
+              </a:lnSpc>
+              <a:spcAft>
+                <a:spcPts val="600"/>
+              </a:spcAft>
+              <a:buFont typeface="Arial" panose="020B0604020202020204" pitchFamily="34" charset="0"/>
+              <a:buChar char="•"/>
+            </a:pPr>
             <a:r>
               <a:rPr lang="en-US" sz="2000"/>
-              <a:t> When Aggressive dominates, ARL widens spreads to reduce risk.</a:t>
-            </a:r>
-          </a:p>
-          <a:p>
+              <a:t>Performance stayed consistent across calm and volatile regimes. </a:t>
+            </a:r>
+          </a:p>
+          <a:p>
+            <a:pPr marL="285750" indent="-228600">
+              <a:lnSpc>
+                <a:spcPct val="90000"/>
+              </a:lnSpc>
+              <a:spcAft>
+                <a:spcPts val="600"/>
+              </a:spcAft>
+              <a:buFont typeface="Arial" panose="020B0604020202020204" pitchFamily="34" charset="0"/>
+              <a:buChar char="•"/>
+            </a:pPr>
             <a:r>
               <a:rPr lang="en-US" sz="2000"/>
-              <a:t>Passive traders eventually dominate (&gt;99%) due to ARL pressure.</a:t>
-            </a:r>
-          </a:p>
-          <a:p>
-            <a:r>
-              <a:rPr lang="en-US" sz="2000"/>
-              <a:t>Clear feedback loop emerges: each agent type shapes the other’s behavior.</a:t>
+              <a:t>ARL remained stable even as the EGT population evolved.</a:t>
             </a:r>
           </a:p>
         </p:txBody>
       </p:sp>
       <p:pic>
         <p:nvPicPr>
-          <p:cNvPr id="5" name="Picture 4" descr="A graph with orange lines&#10;&#10;AI-generated content may be incorrect.">
-            <a:extLst>
-              <a:ext uri="{FF2B5EF4-FFF2-40B4-BE49-F238E27FC236}">
-                <a16:creationId xmlns:a16="http://schemas.microsoft.com/office/drawing/2014/main" id="{24A44C00-F34C-5EE0-1D65-91DEFDE21548}"/>
+          <p:cNvPr id="9" name="Content Placeholder 8" descr="A graph showing a line graph&#10;&#10;AI-generated content may be incorrect.">
+            <a:extLst>
+              <a:ext uri="{FF2B5EF4-FFF2-40B4-BE49-F238E27FC236}">
+                <a16:creationId xmlns:a16="http://schemas.microsoft.com/office/drawing/2014/main" id="{1D0280F6-38F9-1083-200E-F6AA88A8AAD0}"/>
               </a:ext>
             </a:extLst>
           </p:cNvPr>
           <p:cNvPicPr>
-            <a:picLocks noChangeAspect="1"/>
+            <a:picLocks noGrp="1" noChangeAspect="1"/>
           </p:cNvPicPr>
-          <p:nvPr/>
+          <p:nvPr>
+            <p:ph idx="1"/>
+          </p:nvPr>
         </p:nvPicPr>
         <p:blipFill>
           <a:blip r:embed="rId2">
@@ -9976,7 +9557,7 @@
       </p:pic>
       <p:sp>
         <p:nvSpPr>
-          <p:cNvPr id="16" name="Rectangle 15">
+          <p:cNvPr id="23" name="Rectangle 22">
             <a:extLst>
               <a:ext uri="{FF2B5EF4-FFF2-40B4-BE49-F238E27FC236}">
                 <a16:creationId xmlns:a16="http://schemas.microsoft.com/office/drawing/2014/main" id="{E6995CE5-F890-4ABA-82A2-26507CE8D2A3}"/>
@@ -10040,7 +9621,7 @@
     </p:spTree>
     <p:extLst>
       <p:ext uri="{BB962C8B-B14F-4D97-AF65-F5344CB8AC3E}">
-        <p14:creationId xmlns:p14="http://schemas.microsoft.com/office/powerpoint/2010/main" val="3502722188"/>
+        <p14:creationId xmlns:p14="http://schemas.microsoft.com/office/powerpoint/2010/main" val="3129656432"/>
       </p:ext>
     </p:extLst>
   </p:cSld>

</xml_diff>

<commit_message>
Finalized ppt and script
</commit_message>
<xml_diff>
--- a/presentation.pptx
+++ b/presentation.pptx
@@ -9044,7 +9044,7 @@
           <a:p>
             <a:fld id="{008829AC-564D-4DC6-A57F-0801BB802372}" type="datetimeFigureOut">
               <a:rPr lang="en-US" smtClean="0"/>
-              <a:t>12/6/2025</a:t>
+              <a:t>12/8/2025</a:t>
             </a:fld>
             <a:endParaRPr lang="en-US"/>
           </a:p>
@@ -10715,7 +10715,7 @@
           <a:p>
             <a:fld id="{09D397A9-6129-4C50-B0E5-F102EDF526C0}" type="datetimeFigureOut">
               <a:rPr lang="en-US" smtClean="0"/>
-              <a:t>12/6/2025</a:t>
+              <a:t>12/8/2025</a:t>
             </a:fld>
             <a:endParaRPr lang="en-US"/>
           </a:p>
@@ -10913,7 +10913,7 @@
           <a:p>
             <a:fld id="{09D397A9-6129-4C50-B0E5-F102EDF526C0}" type="datetimeFigureOut">
               <a:rPr lang="en-US" smtClean="0"/>
-              <a:t>12/6/2025</a:t>
+              <a:t>12/8/2025</a:t>
             </a:fld>
             <a:endParaRPr lang="en-US"/>
           </a:p>
@@ -11121,7 +11121,7 @@
           <a:p>
             <a:fld id="{09D397A9-6129-4C50-B0E5-F102EDF526C0}" type="datetimeFigureOut">
               <a:rPr lang="en-US" smtClean="0"/>
-              <a:t>12/6/2025</a:t>
+              <a:t>12/8/2025</a:t>
             </a:fld>
             <a:endParaRPr lang="en-US"/>
           </a:p>
@@ -11319,7 +11319,7 @@
           <a:p>
             <a:fld id="{09D397A9-6129-4C50-B0E5-F102EDF526C0}" type="datetimeFigureOut">
               <a:rPr lang="en-US" smtClean="0"/>
-              <a:t>12/6/2025</a:t>
+              <a:t>12/8/2025</a:t>
             </a:fld>
             <a:endParaRPr lang="en-US"/>
           </a:p>
@@ -11594,7 +11594,7 @@
           <a:p>
             <a:fld id="{09D397A9-6129-4C50-B0E5-F102EDF526C0}" type="datetimeFigureOut">
               <a:rPr lang="en-US" smtClean="0"/>
-              <a:t>12/6/2025</a:t>
+              <a:t>12/8/2025</a:t>
             </a:fld>
             <a:endParaRPr lang="en-US"/>
           </a:p>
@@ -11859,7 +11859,7 @@
           <a:p>
             <a:fld id="{09D397A9-6129-4C50-B0E5-F102EDF526C0}" type="datetimeFigureOut">
               <a:rPr lang="en-US" smtClean="0"/>
-              <a:t>12/6/2025</a:t>
+              <a:t>12/8/2025</a:t>
             </a:fld>
             <a:endParaRPr lang="en-US"/>
           </a:p>
@@ -12271,7 +12271,7 @@
           <a:p>
             <a:fld id="{09D397A9-6129-4C50-B0E5-F102EDF526C0}" type="datetimeFigureOut">
               <a:rPr lang="en-US" smtClean="0"/>
-              <a:t>12/6/2025</a:t>
+              <a:t>12/8/2025</a:t>
             </a:fld>
             <a:endParaRPr lang="en-US"/>
           </a:p>
@@ -12412,7 +12412,7 @@
           <a:p>
             <a:fld id="{09D397A9-6129-4C50-B0E5-F102EDF526C0}" type="datetimeFigureOut">
               <a:rPr lang="en-US" smtClean="0"/>
-              <a:t>12/6/2025</a:t>
+              <a:t>12/8/2025</a:t>
             </a:fld>
             <a:endParaRPr lang="en-US"/>
           </a:p>
@@ -12525,7 +12525,7 @@
           <a:p>
             <a:fld id="{09D397A9-6129-4C50-B0E5-F102EDF526C0}" type="datetimeFigureOut">
               <a:rPr lang="en-US" smtClean="0"/>
-              <a:t>12/6/2025</a:t>
+              <a:t>12/8/2025</a:t>
             </a:fld>
             <a:endParaRPr lang="en-US"/>
           </a:p>
@@ -12836,7 +12836,7 @@
           <a:p>
             <a:fld id="{09D397A9-6129-4C50-B0E5-F102EDF526C0}" type="datetimeFigureOut">
               <a:rPr lang="en-US" smtClean="0"/>
-              <a:t>12/6/2025</a:t>
+              <a:t>12/8/2025</a:t>
             </a:fld>
             <a:endParaRPr lang="en-US"/>
           </a:p>
@@ -13124,7 +13124,7 @@
           <a:p>
             <a:fld id="{09D397A9-6129-4C50-B0E5-F102EDF526C0}" type="datetimeFigureOut">
               <a:rPr lang="en-US" smtClean="0"/>
-              <a:t>12/6/2025</a:t>
+              <a:t>12/8/2025</a:t>
             </a:fld>
             <a:endParaRPr lang="en-US"/>
           </a:p>
@@ -13365,7 +13365,7 @@
           <a:p>
             <a:fld id="{09D397A9-6129-4C50-B0E5-F102EDF526C0}" type="datetimeFigureOut">
               <a:rPr lang="en-US" smtClean="0"/>
-              <a:t>12/6/2025</a:t>
+              <a:t>12/8/2025</a:t>
             </a:fld>
             <a:endParaRPr lang="en-US"/>
           </a:p>
@@ -14964,6 +14964,36 @@
           </a:prstGeom>
         </p:spPr>
       </p:pic>
+      <p:pic>
+        <p:nvPicPr>
+          <p:cNvPr id="3" name="Picture 2">
+            <a:extLst>
+              <a:ext uri="{FF2B5EF4-FFF2-40B4-BE49-F238E27FC236}">
+                <a16:creationId xmlns:a16="http://schemas.microsoft.com/office/drawing/2014/main" id="{CE6C6EEE-46F3-7F6B-02DC-978E62DC9563}"/>
+              </a:ext>
+            </a:extLst>
+          </p:cNvPr>
+          <p:cNvPicPr>
+            <a:picLocks noChangeAspect="1"/>
+          </p:cNvPicPr>
+          <p:nvPr/>
+        </p:nvPicPr>
+        <p:blipFill>
+          <a:blip r:embed="rId8"/>
+          <a:stretch>
+            <a:fillRect/>
+          </a:stretch>
+        </p:blipFill>
+        <p:spPr>
+          <a:xfrm>
+            <a:off x="10062190" y="810190"/>
+            <a:ext cx="58085" cy="83255"/>
+          </a:xfrm>
+          <a:prstGeom prst="rect">
+            <a:avLst/>
+          </a:prstGeom>
+        </p:spPr>
+      </p:pic>
     </p:spTree>
     <p:extLst>
       <p:ext uri="{BB962C8B-B14F-4D97-AF65-F5344CB8AC3E}">
@@ -15515,6 +15545,66 @@
           </a:prstGeom>
         </p:spPr>
       </p:pic>
+      <p:pic>
+        <p:nvPicPr>
+          <p:cNvPr id="6" name="Picture 5">
+            <a:extLst>
+              <a:ext uri="{FF2B5EF4-FFF2-40B4-BE49-F238E27FC236}">
+                <a16:creationId xmlns:a16="http://schemas.microsoft.com/office/drawing/2014/main" id="{F730D811-A370-B362-B5DD-47192FC5CBB1}"/>
+              </a:ext>
+            </a:extLst>
+          </p:cNvPr>
+          <p:cNvPicPr>
+            <a:picLocks noChangeAspect="1"/>
+          </p:cNvPicPr>
+          <p:nvPr/>
+        </p:nvPicPr>
+        <p:blipFill>
+          <a:blip r:embed="rId5"/>
+          <a:stretch>
+            <a:fillRect/>
+          </a:stretch>
+        </p:blipFill>
+        <p:spPr>
+          <a:xfrm>
+            <a:off x="8289494" y="828025"/>
+            <a:ext cx="58933" cy="84470"/>
+          </a:xfrm>
+          <a:prstGeom prst="rect">
+            <a:avLst/>
+          </a:prstGeom>
+        </p:spPr>
+      </p:pic>
+      <p:pic>
+        <p:nvPicPr>
+          <p:cNvPr id="9" name="Picture 8">
+            <a:extLst>
+              <a:ext uri="{FF2B5EF4-FFF2-40B4-BE49-F238E27FC236}">
+                <a16:creationId xmlns:a16="http://schemas.microsoft.com/office/drawing/2014/main" id="{3CFA822D-89B7-8472-79A4-63CFA9632A4B}"/>
+              </a:ext>
+            </a:extLst>
+          </p:cNvPr>
+          <p:cNvPicPr>
+            <a:picLocks noChangeAspect="1"/>
+          </p:cNvPicPr>
+          <p:nvPr/>
+        </p:nvPicPr>
+        <p:blipFill>
+          <a:blip r:embed="rId5"/>
+          <a:stretch>
+            <a:fillRect/>
+          </a:stretch>
+        </p:blipFill>
+        <p:spPr>
+          <a:xfrm>
+            <a:off x="8521065" y="3631212"/>
+            <a:ext cx="59934" cy="85906"/>
+          </a:xfrm>
+          <a:prstGeom prst="rect">
+            <a:avLst/>
+          </a:prstGeom>
+        </p:spPr>
+      </p:pic>
     </p:spTree>
     <p:extLst>
       <p:ext uri="{BB962C8B-B14F-4D97-AF65-F5344CB8AC3E}">
@@ -15561,10 +15651,10 @@
       </p:grpSpPr>
       <p:sp useBgFill="1">
         <p:nvSpPr>
-          <p:cNvPr id="32" name="Rectangle 31">
+          <p:cNvPr id="56" name="Rectangle 55">
             <a:extLst>
               <a:ext uri="{FF2B5EF4-FFF2-40B4-BE49-F238E27FC236}">
-                <a16:creationId xmlns:a16="http://schemas.microsoft.com/office/drawing/2014/main" id="{EB708185-20C0-40F2-8F2D-8EB9E34B3C00}"/>
+                <a16:creationId xmlns:a16="http://schemas.microsoft.com/office/drawing/2014/main" id="{149FB5C3-7336-4FE0-A30C-CC0A3646D499}"/>
               </a:ext>
               <a:ext uri="{C183D7F6-B498-43B3-948B-1728B52AA6E4}">
                 <adec:decorative xmlns:adec="http://schemas.microsoft.com/office/drawing/2017/decorative" val="1"/>
@@ -15621,7 +15711,7 @@
       </p:sp>
       <p:grpSp>
         <p:nvGrpSpPr>
-          <p:cNvPr id="34" name="Group 33">
+          <p:cNvPr id="58" name="Group 57">
             <a:extLst>
               <a:ext uri="{FF2B5EF4-FFF2-40B4-BE49-F238E27FC236}">
                 <a16:creationId xmlns:a16="http://schemas.microsoft.com/office/drawing/2014/main" id="{19A6B5CE-CB1D-48EE-8B43-E952235C8371}"/>
@@ -15655,7 +15745,7 @@
         </p:grpSpPr>
         <p:sp>
           <p:nvSpPr>
-            <p:cNvPr id="35" name="Rectangle 34">
+            <p:cNvPr id="59" name="Rectangle 58">
               <a:extLst>
                 <a:ext uri="{FF2B5EF4-FFF2-40B4-BE49-F238E27FC236}">
                   <a16:creationId xmlns:a16="http://schemas.microsoft.com/office/drawing/2014/main" id="{E3F3EAA5-4E15-400B-BBA3-82B3F49A2178}"/>
@@ -15714,7 +15804,7 @@
         </p:sp>
         <p:sp>
           <p:nvSpPr>
-            <p:cNvPr id="36" name="Rectangle 35">
+            <p:cNvPr id="60" name="Rectangle 59">
               <a:extLst>
                 <a:ext uri="{FF2B5EF4-FFF2-40B4-BE49-F238E27FC236}">
                   <a16:creationId xmlns:a16="http://schemas.microsoft.com/office/drawing/2014/main" id="{72BA2E40-BE9B-4C54-9CDD-40EE804CCE64}"/>
@@ -15774,7 +15864,7 @@
       </p:grpSp>
       <p:sp>
         <p:nvSpPr>
-          <p:cNvPr id="50" name="Rectangle 49">
+          <p:cNvPr id="62" name="Rectangle 61">
             <a:extLst>
               <a:ext uri="{FF2B5EF4-FFF2-40B4-BE49-F238E27FC236}">
                 <a16:creationId xmlns:a16="http://schemas.microsoft.com/office/drawing/2014/main" id="{0DA909B4-15FF-46A6-8A7F-7AEF977FE9ED}"/>
@@ -15880,7 +15970,7 @@
       </p:sp>
       <p:sp>
         <p:nvSpPr>
-          <p:cNvPr id="51" name="Rectangle 50">
+          <p:cNvPr id="64" name="Rectangle 63">
             <a:extLst>
               <a:ext uri="{FF2B5EF4-FFF2-40B4-BE49-F238E27FC236}">
                 <a16:creationId xmlns:a16="http://schemas.microsoft.com/office/drawing/2014/main" id="{1382A32C-5B0C-4B1C-A074-76C6DBCC9F87}"/>
@@ -15970,25 +16060,25 @@
           <a:lstStyle/>
           <a:p>
             <a:r>
-              <a:rPr lang="af-ZA" sz="1700" dirty="0"/>
+              <a:rPr lang="af-ZA" sz="1900"/>
               <a:t>The AI isn’t lucky, it made small returns over a long period of time.</a:t>
             </a:r>
           </a:p>
           <a:p>
             <a:r>
-              <a:rPr lang="af-ZA" sz="1700" dirty="0"/>
+              <a:rPr lang="af-ZA" sz="1900"/>
               <a:t>When the agent makes a mistake, it learnt to recover from the loss, instead of tilting and losing more like our previous iteration. </a:t>
             </a:r>
           </a:p>
           <a:p>
             <a:r>
-              <a:rPr lang="en-US" sz="1700" dirty="0"/>
+              <a:rPr lang="en-US" sz="1900"/>
               <a:t>The bright center line proves the agent learned to keep its inventory near zero, validating that it understands risk management. </a:t>
             </a:r>
           </a:p>
           <a:p>
             <a:r>
-              <a:rPr lang="en-US" sz="1700" dirty="0"/>
+              <a:rPr lang="en-US" sz="1900"/>
               <a:t>It makes money by trading flow, not by taking dangerous bets on the direction of the stock.</a:t>
             </a:r>
           </a:p>
@@ -16023,8 +16113,8 @@
         </p:blipFill>
         <p:spPr>
           <a:xfrm>
-            <a:off x="6946666" y="774285"/>
-            <a:ext cx="2112264" cy="1999673"/>
+            <a:off x="7777976" y="774285"/>
+            <a:ext cx="2726502" cy="2581173"/>
           </a:xfrm>
           <a:prstGeom prst="rect">
             <a:avLst/>
@@ -16033,10 +16123,10 @@
       </p:pic>
       <p:pic>
         <p:nvPicPr>
-          <p:cNvPr id="7" name="Picture 6" descr="A graph showing a graph&#10;&#10;AI-generated content may be incorrect.">
+          <p:cNvPr id="5" name="Picture 4" descr="A graph showing a number of data&#10;&#10;AI-generated content may be incorrect.">
             <a:extLst>
               <a:ext uri="{FF2B5EF4-FFF2-40B4-BE49-F238E27FC236}">
-                <a16:creationId xmlns:a16="http://schemas.microsoft.com/office/drawing/2014/main" id="{06807FFC-A01A-9A72-B5EF-969C6A79EDBB}"/>
+                <a16:creationId xmlns:a16="http://schemas.microsoft.com/office/drawing/2014/main" id="{B5335CB0-0D3C-573D-4EA1-C431CFC51BB0}"/>
               </a:ext>
             </a:extLst>
           </p:cNvPr>
@@ -16053,43 +16143,6 @@
               </a:ext>
             </a:extLst>
           </a:blip>
-          <a:srcRect l="17656" r="3126" b="6"/>
-          <a:stretch>
-            <a:fillRect/>
-          </a:stretch>
-        </p:blipFill>
-        <p:spPr>
-          <a:xfrm>
-            <a:off x="9223523" y="774285"/>
-            <a:ext cx="2112264" cy="1999673"/>
-          </a:xfrm>
-          <a:prstGeom prst="rect">
-            <a:avLst/>
-          </a:prstGeom>
-        </p:spPr>
-      </p:pic>
-      <p:pic>
-        <p:nvPicPr>
-          <p:cNvPr id="5" name="Picture 4" descr="A graph showing a number of data&#10;&#10;AI-generated content may be incorrect.">
-            <a:extLst>
-              <a:ext uri="{FF2B5EF4-FFF2-40B4-BE49-F238E27FC236}">
-                <a16:creationId xmlns:a16="http://schemas.microsoft.com/office/drawing/2014/main" id="{B5335CB0-0D3C-573D-4EA1-C431CFC51BB0}"/>
-              </a:ext>
-            </a:extLst>
-          </p:cNvPr>
-          <p:cNvPicPr>
-            <a:picLocks noChangeAspect="1"/>
-          </p:cNvPicPr>
-          <p:nvPr/>
-        </p:nvPicPr>
-        <p:blipFill>
-          <a:blip r:embed="rId5">
-            <a:extLst>
-              <a:ext uri="{28A0092B-C50C-407E-A947-70E740481C1C}">
-                <a14:useLocalDpi xmlns:a14="http://schemas.microsoft.com/office/drawing/2010/main" val="0"/>
-              </a:ext>
-            </a:extLst>
-          </a:blip>
           <a:srcRect l="2442" r="12193" b="-1"/>
           <a:stretch>
             <a:fillRect/>
@@ -16097,8 +16150,8 @@
         </p:blipFill>
         <p:spPr>
           <a:xfrm>
-            <a:off x="6946667" y="2942704"/>
-            <a:ext cx="4389120" cy="3213543"/>
+            <a:off x="7378510" y="3575074"/>
+            <a:ext cx="3525434" cy="2581173"/>
           </a:xfrm>
           <a:prstGeom prst="rect">
             <a:avLst/>
@@ -16932,7 +16985,7 @@
         </p:spPr>
         <p:txBody>
           <a:bodyPr anchor="ctr">
-            <a:normAutofit/>
+            <a:normAutofit lnSpcReduction="10000"/>
           </a:bodyPr>
           <a:lstStyle/>
           <a:p>
@@ -16966,7 +17019,18 @@
               <a:rPr lang="en-US" sz="2200" dirty="0"/>
               <a:t>Replace heuristic EGT agents with other RL agents (Multi-Agent Reinforcement Learning) for a "smarter" enemy.</a:t>
             </a:r>
-            <a:endParaRPr lang="en-US" sz="2200" b="1" dirty="0"/>
+          </a:p>
+          <a:p>
+            <a:pPr lvl="1"/>
+            <a:r>
+              <a:rPr lang="en-US" sz="2200" dirty="0"/>
+              <a:t>Adding a LOB to give more options for the Arl agent to set </a:t>
+            </a:r>
+            <a:r>
+              <a:rPr lang="en-US" dirty="0"/>
+              <a:t>prices through actual buy and sell orders stacked at different levels.</a:t>
+            </a:r>
+            <a:endParaRPr lang="en-US" sz="2200" dirty="0"/>
           </a:p>
         </p:txBody>
       </p:sp>
@@ -18215,7 +18279,7 @@
             </a:r>
             <a:r>
               <a:rPr lang="en-US" sz="1900" dirty="0"/>
-              <a:t>A simulated order-book market where agents interact via "crossing quotes.</a:t>
+              <a:t>A simulated market where agents interact via crossing quotes.</a:t>
             </a:r>
           </a:p>
           <a:p>
@@ -21178,6 +21242,36 @@
           <a:xfrm>
             <a:off x="7602038" y="3707894"/>
             <a:ext cx="3358339" cy="2518756"/>
+          </a:xfrm>
+          <a:prstGeom prst="rect">
+            <a:avLst/>
+          </a:prstGeom>
+        </p:spPr>
+      </p:pic>
+      <p:pic>
+        <p:nvPicPr>
+          <p:cNvPr id="7" name="Picture 6">
+            <a:extLst>
+              <a:ext uri="{FF2B5EF4-FFF2-40B4-BE49-F238E27FC236}">
+                <a16:creationId xmlns:a16="http://schemas.microsoft.com/office/drawing/2014/main" id="{ED102EEC-6CC0-C936-C672-19E6C2EB2DC0}"/>
+              </a:ext>
+            </a:extLst>
+          </p:cNvPr>
+          <p:cNvPicPr>
+            <a:picLocks noChangeAspect="1"/>
+          </p:cNvPicPr>
+          <p:nvPr/>
+        </p:nvPicPr>
+        <p:blipFill>
+          <a:blip r:embed="rId5"/>
+          <a:stretch>
+            <a:fillRect/>
+          </a:stretch>
+        </p:blipFill>
+        <p:spPr>
+          <a:xfrm>
+            <a:off x="8807235" y="3762375"/>
+            <a:ext cx="56292" cy="80685"/>
           </a:xfrm>
           <a:prstGeom prst="rect">
             <a:avLst/>

</xml_diff>